<commit_message>
add delete confirmation, edit data, edit powerpoint and clean up code
</commit_message>
<xml_diff>
--- a/FormAutomation.pptx
+++ b/FormAutomation.pptx
@@ -11,9 +11,11 @@
     <p:sldId id="259" r:id="rId5"/>
     <p:sldId id="261" r:id="rId6"/>
     <p:sldId id="262" r:id="rId7"/>
-    <p:sldId id="263" r:id="rId8"/>
-    <p:sldId id="264" r:id="rId9"/>
-    <p:sldId id="265" r:id="rId10"/>
+    <p:sldId id="266" r:id="rId8"/>
+    <p:sldId id="267" r:id="rId9"/>
+    <p:sldId id="263" r:id="rId10"/>
+    <p:sldId id="264" r:id="rId11"/>
+    <p:sldId id="265" r:id="rId12"/>
   </p:sldIdLst>
   <p:sldSz cx="12192000" cy="6858000"/>
   <p:notesSz cx="6858000" cy="9144000"/>
@@ -112,6 +114,11 @@
       </a:defRPr>
     </a:lvl9pPr>
   </p:defaultTextStyle>
+  <p:extLst>
+    <p:ext uri="{EFAFB233-063F-42B5-8137-9DF3F51BA10A}">
+      <p15:sldGuideLst xmlns:p15="http://schemas.microsoft.com/office/powerpoint/2012/main"/>
+    </p:ext>
+  </p:extLst>
 </p:presentation>
 </file>
 
@@ -6004,7 +6011,7 @@
           <a:p>
             <a:fld id="{48A87A34-81AB-432B-8DAE-1953F412C126}" type="datetimeFigureOut">
               <a:rPr lang="en-US" dirty="0"/>
-              <a:t>4/14/21</a:t>
+              <a:t>4/15/21</a:t>
             </a:fld>
             <a:endParaRPr lang="en-US" dirty="0"/>
           </a:p>
@@ -6270,7 +6277,7 @@
             <a:fld id="{48A87A34-81AB-432B-8DAE-1953F412C126}" type="datetimeFigureOut">
               <a:rPr lang="en-US" dirty="0"/>
               <a:pPr/>
-              <a:t>4/14/21</a:t>
+              <a:t>4/15/21</a:t>
             </a:fld>
             <a:endParaRPr lang="en-US" dirty="0"/>
           </a:p>
@@ -6502,7 +6509,7 @@
             <a:fld id="{48A87A34-81AB-432B-8DAE-1953F412C126}" type="datetimeFigureOut">
               <a:rPr lang="en-US" dirty="0"/>
               <a:pPr/>
-              <a:t>4/14/21</a:t>
+              <a:t>4/15/21</a:t>
             </a:fld>
             <a:endParaRPr lang="en-US" dirty="0"/>
           </a:p>
@@ -6813,7 +6820,7 @@
             <a:fld id="{48A87A34-81AB-432B-8DAE-1953F412C126}" type="datetimeFigureOut">
               <a:rPr lang="en-US" dirty="0"/>
               <a:pPr/>
-              <a:t>4/14/21</a:t>
+              <a:t>4/15/21</a:t>
             </a:fld>
             <a:endParaRPr lang="en-US" dirty="0"/>
           </a:p>
@@ -7287,7 +7294,7 @@
             <a:fld id="{48A87A34-81AB-432B-8DAE-1953F412C126}" type="datetimeFigureOut">
               <a:rPr lang="en-US" dirty="0"/>
               <a:pPr/>
-              <a:t>4/14/21</a:t>
+              <a:t>4/15/21</a:t>
             </a:fld>
             <a:endParaRPr lang="en-US" dirty="0"/>
           </a:p>
@@ -7835,7 +7842,7 @@
             <a:fld id="{48A87A34-81AB-432B-8DAE-1953F412C126}" type="datetimeFigureOut">
               <a:rPr lang="en-US" dirty="0"/>
               <a:pPr/>
-              <a:t>4/14/21</a:t>
+              <a:t>4/15/21</a:t>
             </a:fld>
             <a:endParaRPr lang="en-US" dirty="0"/>
           </a:p>
@@ -8607,7 +8614,7 @@
             <a:fld id="{48A87A34-81AB-432B-8DAE-1953F412C126}" type="datetimeFigureOut">
               <a:rPr lang="en-US" dirty="0"/>
               <a:pPr/>
-              <a:t>4/14/21</a:t>
+              <a:t>4/15/21</a:t>
             </a:fld>
             <a:endParaRPr lang="en-US" dirty="0"/>
           </a:p>
@@ -8781,7 +8788,7 @@
           <a:p>
             <a:fld id="{48A87A34-81AB-432B-8DAE-1953F412C126}" type="datetimeFigureOut">
               <a:rPr lang="en-US" dirty="0"/>
-              <a:t>4/14/21</a:t>
+              <a:t>4/15/21</a:t>
             </a:fld>
             <a:endParaRPr lang="en-US" dirty="0"/>
           </a:p>
@@ -9003,7 +9010,7 @@
             <a:fld id="{48A87A34-81AB-432B-8DAE-1953F412C126}" type="datetimeFigureOut">
               <a:rPr lang="en-US" dirty="0"/>
               <a:pPr/>
-              <a:t>4/14/21</a:t>
+              <a:t>4/15/21</a:t>
             </a:fld>
             <a:endParaRPr lang="en-US" dirty="0"/>
           </a:p>
@@ -9181,7 +9188,7 @@
           <a:p>
             <a:fld id="{48A87A34-81AB-432B-8DAE-1953F412C126}" type="datetimeFigureOut">
               <a:rPr lang="en-US" dirty="0"/>
-              <a:t>4/14/21</a:t>
+              <a:t>4/15/21</a:t>
             </a:fld>
             <a:endParaRPr lang="en-US" dirty="0"/>
           </a:p>
@@ -9470,7 +9477,7 @@
             <a:fld id="{48A87A34-81AB-432B-8DAE-1953F412C126}" type="datetimeFigureOut">
               <a:rPr lang="en-US" dirty="0"/>
               <a:pPr/>
-              <a:t>4/14/21</a:t>
+              <a:t>4/15/21</a:t>
             </a:fld>
             <a:endParaRPr lang="en-US" dirty="0"/>
           </a:p>
@@ -9709,7 +9716,7 @@
           <a:p>
             <a:fld id="{48A87A34-81AB-432B-8DAE-1953F412C126}" type="datetimeFigureOut">
               <a:rPr lang="en-US" dirty="0"/>
-              <a:t>4/14/21</a:t>
+              <a:t>4/15/21</a:t>
             </a:fld>
             <a:endParaRPr lang="en-US" dirty="0"/>
           </a:p>
@@ -10085,7 +10092,7 @@
           <a:p>
             <a:fld id="{48A87A34-81AB-432B-8DAE-1953F412C126}" type="datetimeFigureOut">
               <a:rPr lang="en-US" dirty="0"/>
-              <a:t>4/14/21</a:t>
+              <a:t>4/15/21</a:t>
             </a:fld>
             <a:endParaRPr lang="en-US" dirty="0"/>
           </a:p>
@@ -10202,7 +10209,7 @@
           <a:p>
             <a:fld id="{48A87A34-81AB-432B-8DAE-1953F412C126}" type="datetimeFigureOut">
               <a:rPr lang="en-US" dirty="0"/>
-              <a:t>4/14/21</a:t>
+              <a:t>4/15/21</a:t>
             </a:fld>
             <a:endParaRPr lang="en-US" dirty="0"/>
           </a:p>
@@ -10297,7 +10304,7 @@
           <a:p>
             <a:fld id="{48A87A34-81AB-432B-8DAE-1953F412C126}" type="datetimeFigureOut">
               <a:rPr lang="en-US" dirty="0"/>
-              <a:t>4/14/21</a:t>
+              <a:t>4/15/21</a:t>
             </a:fld>
             <a:endParaRPr lang="en-US" dirty="0"/>
           </a:p>
@@ -10544,7 +10551,7 @@
           <a:p>
             <a:fld id="{48A87A34-81AB-432B-8DAE-1953F412C126}" type="datetimeFigureOut">
               <a:rPr lang="en-US" dirty="0"/>
-              <a:t>4/14/21</a:t>
+              <a:t>4/15/21</a:t>
             </a:fld>
             <a:endParaRPr lang="en-US" dirty="0"/>
           </a:p>
@@ -10799,7 +10806,7 @@
           <a:p>
             <a:fld id="{48A87A34-81AB-432B-8DAE-1953F412C126}" type="datetimeFigureOut">
               <a:rPr lang="en-US" dirty="0"/>
-              <a:t>4/14/21</a:t>
+              <a:t>4/15/21</a:t>
             </a:fld>
             <a:endParaRPr lang="en-US" dirty="0"/>
           </a:p>
@@ -11041,7 +11048,7 @@
             <a:fld id="{48A87A34-81AB-432B-8DAE-1953F412C126}" type="datetimeFigureOut">
               <a:rPr lang="en-US" dirty="0"/>
               <a:pPr/>
-              <a:t>4/14/21</a:t>
+              <a:t>4/15/21</a:t>
             </a:fld>
             <a:endParaRPr lang="en-US" dirty="0"/>
           </a:p>
@@ -11842,6 +11849,346 @@
 </p:sld>
 </file>
 
+<file path=ppt/slides/slide10.xml><?xml version="1.0" encoding="utf-8"?>
+<p:sld xmlns:a="http://schemas.openxmlformats.org/drawingml/2006/main" xmlns:r="http://schemas.openxmlformats.org/officeDocument/2006/relationships" xmlns:p="http://schemas.openxmlformats.org/presentationml/2006/main">
+  <p:cSld>
+    <p:bg>
+      <p:bgPr>
+        <a:solidFill>
+          <a:schemeClr val="bg1"/>
+        </a:solidFill>
+        <a:effectLst/>
+      </p:bgPr>
+    </p:bg>
+    <p:spTree>
+      <p:nvGrpSpPr>
+        <p:cNvPr id="1" name=""/>
+        <p:cNvGrpSpPr/>
+        <p:nvPr/>
+      </p:nvGrpSpPr>
+      <p:grpSpPr>
+        <a:xfrm>
+          <a:off x="0" y="0"/>
+          <a:ext cx="0" cy="0"/>
+          <a:chOff x="0" y="0"/>
+          <a:chExt cx="0" cy="0"/>
+        </a:xfrm>
+      </p:grpSpPr>
+      <p:sp>
+        <p:nvSpPr>
+          <p:cNvPr id="2" name="Title 1">
+            <a:extLst>
+              <a:ext uri="{FF2B5EF4-FFF2-40B4-BE49-F238E27FC236}">
+                <a16:creationId xmlns:a16="http://schemas.microsoft.com/office/drawing/2014/main" id="{1341808A-88E2-914D-9EF9-27C47D35B8F2}"/>
+              </a:ext>
+            </a:extLst>
+          </p:cNvPr>
+          <p:cNvSpPr>
+            <a:spLocks noGrp="1"/>
+          </p:cNvSpPr>
+          <p:nvPr>
+            <p:ph type="title"/>
+          </p:nvPr>
+        </p:nvSpPr>
+        <p:spPr>
+          <a:xfrm>
+            <a:off x="619759" y="764373"/>
+            <a:ext cx="6257291" cy="1293028"/>
+          </a:xfrm>
+        </p:spPr>
+        <p:txBody>
+          <a:bodyPr>
+            <a:normAutofit/>
+          </a:bodyPr>
+          <a:lstStyle/>
+          <a:p>
+            <a:r>
+              <a:rPr lang="en-US" sz="3700"/>
+              <a:t>form pertanggungjawaban</a:t>
+            </a:r>
+          </a:p>
+        </p:txBody>
+      </p:sp>
+      <p:sp>
+        <p:nvSpPr>
+          <p:cNvPr id="9" name="Content Placeholder 8">
+            <a:extLst>
+              <a:ext uri="{FF2B5EF4-FFF2-40B4-BE49-F238E27FC236}">
+                <a16:creationId xmlns:a16="http://schemas.microsoft.com/office/drawing/2014/main" id="{F03BFE80-07F7-4A72-952D-CF74B7593589}"/>
+              </a:ext>
+            </a:extLst>
+          </p:cNvPr>
+          <p:cNvSpPr>
+            <a:spLocks noGrp="1"/>
+          </p:cNvSpPr>
+          <p:nvPr>
+            <p:ph idx="1"/>
+          </p:nvPr>
+        </p:nvSpPr>
+        <p:spPr>
+          <a:xfrm>
+            <a:off x="619760" y="2194560"/>
+            <a:ext cx="6257290" cy="4024125"/>
+          </a:xfrm>
+        </p:spPr>
+        <p:txBody>
+          <a:bodyPr>
+            <a:normAutofit/>
+          </a:bodyPr>
+          <a:lstStyle/>
+          <a:p>
+            <a:endParaRPr lang="en-US"/>
+          </a:p>
+        </p:txBody>
+      </p:sp>
+      <p:sp useBgFill="1">
+        <p:nvSpPr>
+          <p:cNvPr id="12" name="Rectangle 11">
+            <a:extLst>
+              <a:ext uri="{FF2B5EF4-FFF2-40B4-BE49-F238E27FC236}">
+                <a16:creationId xmlns:a16="http://schemas.microsoft.com/office/drawing/2014/main" id="{E2E0C929-96C6-41B1-A001-566036DF047B}"/>
+              </a:ext>
+              <a:ext uri="{C183D7F6-B498-43B3-948B-1728B52AA6E4}">
+                <adec:decorative xmlns:adec="http://schemas.microsoft.com/office/drawing/2017/decorative" val="1"/>
+              </a:ext>
+            </a:extLst>
+          </p:cNvPr>
+          <p:cNvSpPr>
+            <a:spLocks noGrp="1" noRot="1" noChangeAspect="1" noMove="1" noResize="1" noEditPoints="1" noAdjustHandles="1" noChangeArrowheads="1" noChangeShapeType="1" noTextEdit="1"/>
+          </p:cNvSpPr>
+          <p:nvPr>
+            <p:extLst>
+              <p:ext uri="{386F3935-93C4-4BCD-93E2-E3B085C9AB24}">
+                <p16:designElem xmlns:p16="http://schemas.microsoft.com/office/powerpoint/2015/main" val="1"/>
+              </p:ext>
+            </p:extLst>
+          </p:nvPr>
+        </p:nvSpPr>
+        <p:spPr>
+          <a:xfrm>
+            <a:off x="7188740" y="0"/>
+            <a:ext cx="5003254" cy="6858000"/>
+          </a:xfrm>
+          <a:prstGeom prst="rect">
+            <a:avLst/>
+          </a:prstGeom>
+          <a:ln>
+            <a:noFill/>
+          </a:ln>
+        </p:spPr>
+        <p:style>
+          <a:lnRef idx="2">
+            <a:schemeClr val="accent1">
+              <a:shade val="50000"/>
+            </a:schemeClr>
+          </a:lnRef>
+          <a:fillRef idx="1">
+            <a:schemeClr val="accent1"/>
+          </a:fillRef>
+          <a:effectRef idx="0">
+            <a:schemeClr val="accent1"/>
+          </a:effectRef>
+          <a:fontRef idx="minor">
+            <a:schemeClr val="lt1"/>
+          </a:fontRef>
+        </p:style>
+        <p:txBody>
+          <a:bodyPr rtlCol="0" anchor="ctr"/>
+          <a:lstStyle/>
+          <a:p>
+            <a:pPr algn="ctr"/>
+            <a:endParaRPr lang="en-US"/>
+          </a:p>
+        </p:txBody>
+      </p:sp>
+      <p:pic>
+        <p:nvPicPr>
+          <p:cNvPr id="5" name="Content Placeholder 4" descr="Table&#10;&#10;Description automatically generated">
+            <a:extLst>
+              <a:ext uri="{FF2B5EF4-FFF2-40B4-BE49-F238E27FC236}">
+                <a16:creationId xmlns:a16="http://schemas.microsoft.com/office/drawing/2014/main" id="{AEC29793-9663-3A44-A3AE-3D45433814B0}"/>
+              </a:ext>
+            </a:extLst>
+          </p:cNvPr>
+          <p:cNvPicPr>
+            <a:picLocks noChangeAspect="1"/>
+          </p:cNvPicPr>
+          <p:nvPr/>
+        </p:nvPicPr>
+        <p:blipFill rotWithShape="1">
+          <a:blip r:embed="rId2"/>
+          <a:srcRect r="3698"/>
+          <a:stretch/>
+        </p:blipFill>
+        <p:spPr>
+          <a:xfrm>
+            <a:off x="7519416" y="10"/>
+            <a:ext cx="4672584" cy="6857989"/>
+          </a:xfrm>
+          <a:prstGeom prst="rect">
+            <a:avLst/>
+          </a:prstGeom>
+        </p:spPr>
+      </p:pic>
+    </p:spTree>
+    <p:extLst>
+      <p:ext uri="{BB962C8B-B14F-4D97-AF65-F5344CB8AC3E}">
+        <p14:creationId xmlns:p14="http://schemas.microsoft.com/office/powerpoint/2010/main" val="3418362195"/>
+      </p:ext>
+    </p:extLst>
+  </p:cSld>
+  <p:clrMapOvr>
+    <a:masterClrMapping/>
+  </p:clrMapOvr>
+</p:sld>
+</file>
+
+<file path=ppt/slides/slide11.xml><?xml version="1.0" encoding="utf-8"?>
+<p:sld xmlns:a="http://schemas.openxmlformats.org/drawingml/2006/main" xmlns:r="http://schemas.openxmlformats.org/officeDocument/2006/relationships" xmlns:p="http://schemas.openxmlformats.org/presentationml/2006/main">
+  <p:cSld>
+    <p:bg>
+      <p:bgPr>
+        <a:solidFill>
+          <a:schemeClr val="bg1"/>
+        </a:solidFill>
+        <a:effectLst/>
+      </p:bgPr>
+    </p:bg>
+    <p:spTree>
+      <p:nvGrpSpPr>
+        <p:cNvPr id="1" name=""/>
+        <p:cNvGrpSpPr/>
+        <p:nvPr/>
+      </p:nvGrpSpPr>
+      <p:grpSpPr>
+        <a:xfrm>
+          <a:off x="0" y="0"/>
+          <a:ext cx="0" cy="0"/>
+          <a:chOff x="0" y="0"/>
+          <a:chExt cx="0" cy="0"/>
+        </a:xfrm>
+      </p:grpSpPr>
+      <p:sp>
+        <p:nvSpPr>
+          <p:cNvPr id="2" name="Title 1">
+            <a:extLst>
+              <a:ext uri="{FF2B5EF4-FFF2-40B4-BE49-F238E27FC236}">
+                <a16:creationId xmlns:a16="http://schemas.microsoft.com/office/drawing/2014/main" id="{02A67534-04A4-A049-977B-67CBC075D376}"/>
+              </a:ext>
+            </a:extLst>
+          </p:cNvPr>
+          <p:cNvSpPr>
+            <a:spLocks noGrp="1"/>
+          </p:cNvSpPr>
+          <p:nvPr>
+            <p:ph type="title"/>
+          </p:nvPr>
+        </p:nvSpPr>
+        <p:spPr>
+          <a:xfrm>
+            <a:off x="619760" y="764373"/>
+            <a:ext cx="6832600" cy="1293028"/>
+          </a:xfrm>
+        </p:spPr>
+        <p:txBody>
+          <a:bodyPr>
+            <a:normAutofit/>
+          </a:bodyPr>
+          <a:lstStyle/>
+          <a:p>
+            <a:r>
+              <a:rPr lang="en-US"/>
+              <a:t>thank you</a:t>
+            </a:r>
+          </a:p>
+        </p:txBody>
+      </p:sp>
+      <p:sp>
+        <p:nvSpPr>
+          <p:cNvPr id="7" name="Content Placeholder 2">
+            <a:extLst>
+              <a:ext uri="{FF2B5EF4-FFF2-40B4-BE49-F238E27FC236}">
+                <a16:creationId xmlns:a16="http://schemas.microsoft.com/office/drawing/2014/main" id="{059804AC-0040-4248-B541-33CAB104A6DE}"/>
+              </a:ext>
+            </a:extLst>
+          </p:cNvPr>
+          <p:cNvSpPr>
+            <a:spLocks noGrp="1"/>
+          </p:cNvSpPr>
+          <p:nvPr>
+            <p:ph idx="1"/>
+          </p:nvPr>
+        </p:nvSpPr>
+        <p:spPr>
+          <a:xfrm>
+            <a:off x="619760" y="2194560"/>
+            <a:ext cx="6832600" cy="4024125"/>
+          </a:xfrm>
+        </p:spPr>
+        <p:txBody>
+          <a:bodyPr>
+            <a:normAutofit/>
+          </a:bodyPr>
+          <a:lstStyle/>
+          <a:p>
+            <a:pPr marL="0" indent="0">
+              <a:buNone/>
+            </a:pPr>
+            <a:r>
+              <a:rPr lang="en-US"/>
+              <a:t>https://github.com/sindweller2/FormAutomation</a:t>
+            </a:r>
+          </a:p>
+          <a:p>
+            <a:pPr marL="0" indent="0">
+              <a:buNone/>
+            </a:pPr>
+            <a:endParaRPr lang="en-US"/>
+          </a:p>
+        </p:txBody>
+      </p:sp>
+      <p:pic>
+        <p:nvPicPr>
+          <p:cNvPr id="8" name="Picture 4" descr="Data concept">
+            <a:extLst>
+              <a:ext uri="{FF2B5EF4-FFF2-40B4-BE49-F238E27FC236}">
+                <a16:creationId xmlns:a16="http://schemas.microsoft.com/office/drawing/2014/main" id="{394FF601-0705-4513-A2A1-5F9A6C7E2CB3}"/>
+              </a:ext>
+            </a:extLst>
+          </p:cNvPr>
+          <p:cNvPicPr>
+            <a:picLocks noChangeAspect="1"/>
+          </p:cNvPicPr>
+          <p:nvPr/>
+        </p:nvPicPr>
+        <p:blipFill rotWithShape="1">
+          <a:blip r:embed="rId2"/>
+          <a:srcRect l="4043" r="46004" b="1"/>
+          <a:stretch/>
+        </p:blipFill>
+        <p:spPr>
+          <a:xfrm>
+            <a:off x="7861238" y="746125"/>
+            <a:ext cx="3644962" cy="5472559"/>
+          </a:xfrm>
+          <a:prstGeom prst="rect">
+            <a:avLst/>
+          </a:prstGeom>
+        </p:spPr>
+      </p:pic>
+    </p:spTree>
+    <p:extLst>
+      <p:ext uri="{BB962C8B-B14F-4D97-AF65-F5344CB8AC3E}">
+        <p14:creationId xmlns:p14="http://schemas.microsoft.com/office/powerpoint/2010/main" val="1994441202"/>
+      </p:ext>
+    </p:extLst>
+  </p:cSld>
+  <p:clrMapOvr>
+    <a:masterClrMapping/>
+  </p:clrMapOvr>
+</p:sld>
+</file>
+
 <file path=ppt/slides/slide2.xml><?xml version="1.0" encoding="utf-8"?>
 <p:sld xmlns:a="http://schemas.openxmlformats.org/drawingml/2006/main" xmlns:r="http://schemas.openxmlformats.org/officeDocument/2006/relationships" xmlns:p="http://schemas.openxmlformats.org/presentationml/2006/main">
   <p:cSld>
@@ -12653,10 +13000,10 @@
       </p:sp>
       <p:pic>
         <p:nvPicPr>
-          <p:cNvPr id="5" name="Content Placeholder 4" descr="Table&#10;&#10;Description automatically generated with medium confidence">
+          <p:cNvPr id="7" name="Content Placeholder 6" descr="Table&#10;&#10;Description automatically generated">
             <a:extLst>
               <a:ext uri="{FF2B5EF4-FFF2-40B4-BE49-F238E27FC236}">
-                <a16:creationId xmlns:a16="http://schemas.microsoft.com/office/drawing/2014/main" id="{15F3188D-23CD-3A4A-B25A-083E05974F6F}"/>
+                <a16:creationId xmlns:a16="http://schemas.microsoft.com/office/drawing/2014/main" id="{3CFFBA50-42C7-5A4E-885F-62B0DA774F03}"/>
               </a:ext>
             </a:extLst>
           </p:cNvPr>
@@ -12740,10 +13087,10 @@
       </p:sp>
       <p:pic>
         <p:nvPicPr>
-          <p:cNvPr id="5" name="Content Placeholder 4" descr="Graphical user interface, application, table&#10;&#10;Description automatically generated">
+          <p:cNvPr id="7" name="Content Placeholder 6" descr="Graphical user interface, application, table&#10;&#10;Description automatically generated">
             <a:extLst>
               <a:ext uri="{FF2B5EF4-FFF2-40B4-BE49-F238E27FC236}">
-                <a16:creationId xmlns:a16="http://schemas.microsoft.com/office/drawing/2014/main" id="{72AAD2FA-B9F4-B246-9731-AE6BE1F538C5}"/>
+                <a16:creationId xmlns:a16="http://schemas.microsoft.com/office/drawing/2014/main" id="{47938F5F-29D1-894E-8599-9ACF2C62B4EC}"/>
               </a:ext>
             </a:extLst>
           </p:cNvPr>
@@ -12783,14 +13130,6 @@
 <file path=ppt/slides/slide7.xml><?xml version="1.0" encoding="utf-8"?>
 <p:sld xmlns:a="http://schemas.openxmlformats.org/drawingml/2006/main" xmlns:r="http://schemas.openxmlformats.org/officeDocument/2006/relationships" xmlns:p="http://schemas.openxmlformats.org/presentationml/2006/main">
   <p:cSld>
-    <p:bg>
-      <p:bgPr>
-        <a:solidFill>
-          <a:schemeClr val="bg1"/>
-        </a:solidFill>
-        <a:effectLst/>
-      </p:bgPr>
-    </p:bg>
     <p:spTree>
       <p:nvGrpSpPr>
         <p:cNvPr id="1" name=""/>
@@ -12810,7 +13149,7 @@
           <p:cNvPr id="2" name="Title 1">
             <a:extLst>
               <a:ext uri="{FF2B5EF4-FFF2-40B4-BE49-F238E27FC236}">
-                <a16:creationId xmlns:a16="http://schemas.microsoft.com/office/drawing/2014/main" id="{9F25D696-A74A-EF41-B974-09721833B7C1}"/>
+                <a16:creationId xmlns:a16="http://schemas.microsoft.com/office/drawing/2014/main" id="{FE599240-92B1-6246-980A-4FE431503E83}"/>
               </a:ext>
             </a:extLst>
           </p:cNvPr>
@@ -12821,150 +13160,51 @@
             <p:ph type="title"/>
           </p:nvPr>
         </p:nvSpPr>
-        <p:spPr>
-          <a:xfrm>
-            <a:off x="619759" y="764373"/>
-            <a:ext cx="6257291" cy="1293028"/>
-          </a:xfrm>
-        </p:spPr>
+        <p:spPr/>
         <p:txBody>
-          <a:bodyPr>
-            <a:normAutofit/>
-          </a:bodyPr>
+          <a:bodyPr/>
           <a:lstStyle/>
           <a:p>
             <a:r>
               <a:rPr lang="en-US"/>
-              <a:t>form komitmen</a:t>
+              <a:t>edit</a:t>
             </a:r>
-          </a:p>
-        </p:txBody>
-      </p:sp>
-      <p:sp>
-        <p:nvSpPr>
-          <p:cNvPr id="9" name="Content Placeholder 8">
-            <a:extLst>
-              <a:ext uri="{FF2B5EF4-FFF2-40B4-BE49-F238E27FC236}">
-                <a16:creationId xmlns:a16="http://schemas.microsoft.com/office/drawing/2014/main" id="{2A2C78A7-6E88-4A9B-B92E-163D7803EBED}"/>
-              </a:ext>
-            </a:extLst>
-          </p:cNvPr>
-          <p:cNvSpPr>
-            <a:spLocks noGrp="1"/>
-          </p:cNvSpPr>
-          <p:nvPr>
-            <p:ph idx="1"/>
-          </p:nvPr>
-        </p:nvSpPr>
-        <p:spPr>
-          <a:xfrm>
-            <a:off x="619760" y="2194560"/>
-            <a:ext cx="6257290" cy="4024125"/>
-          </a:xfrm>
-        </p:spPr>
-        <p:txBody>
-          <a:bodyPr>
-            <a:normAutofit/>
-          </a:bodyPr>
-          <a:lstStyle/>
-          <a:p>
-            <a:endParaRPr lang="en-US"/>
-          </a:p>
-        </p:txBody>
-      </p:sp>
-      <p:sp useBgFill="1">
-        <p:nvSpPr>
-          <p:cNvPr id="12" name="Rectangle 11">
-            <a:extLst>
-              <a:ext uri="{FF2B5EF4-FFF2-40B4-BE49-F238E27FC236}">
-                <a16:creationId xmlns:a16="http://schemas.microsoft.com/office/drawing/2014/main" id="{E2E0C929-96C6-41B1-A001-566036DF047B}"/>
-              </a:ext>
-              <a:ext uri="{C183D7F6-B498-43B3-948B-1728B52AA6E4}">
-                <adec:decorative xmlns:adec="http://schemas.microsoft.com/office/drawing/2017/decorative" val="1"/>
-              </a:ext>
-            </a:extLst>
-          </p:cNvPr>
-          <p:cNvSpPr>
-            <a:spLocks noGrp="1" noRot="1" noChangeAspect="1" noMove="1" noResize="1" noEditPoints="1" noAdjustHandles="1" noChangeArrowheads="1" noChangeShapeType="1" noTextEdit="1"/>
-          </p:cNvSpPr>
-          <p:nvPr>
-            <p:extLst>
-              <p:ext uri="{386F3935-93C4-4BCD-93E2-E3B085C9AB24}">
-                <p16:designElem xmlns:p16="http://schemas.microsoft.com/office/powerpoint/2015/main" val="1"/>
-              </p:ext>
-            </p:extLst>
-          </p:nvPr>
-        </p:nvSpPr>
-        <p:spPr>
-          <a:xfrm>
-            <a:off x="7188740" y="0"/>
-            <a:ext cx="5003254" cy="6858000"/>
-          </a:xfrm>
-          <a:prstGeom prst="rect">
-            <a:avLst/>
-          </a:prstGeom>
-          <a:ln>
-            <a:noFill/>
-          </a:ln>
-        </p:spPr>
-        <p:style>
-          <a:lnRef idx="2">
-            <a:schemeClr val="accent1">
-              <a:shade val="50000"/>
-            </a:schemeClr>
-          </a:lnRef>
-          <a:fillRef idx="1">
-            <a:schemeClr val="accent1"/>
-          </a:fillRef>
-          <a:effectRef idx="0">
-            <a:schemeClr val="accent1"/>
-          </a:effectRef>
-          <a:fontRef idx="minor">
-            <a:schemeClr val="lt1"/>
-          </a:fontRef>
-        </p:style>
-        <p:txBody>
-          <a:bodyPr rtlCol="0" anchor="ctr"/>
-          <a:lstStyle/>
-          <a:p>
-            <a:pPr algn="ctr"/>
-            <a:endParaRPr lang="en-US"/>
           </a:p>
         </p:txBody>
       </p:sp>
       <p:pic>
         <p:nvPicPr>
-          <p:cNvPr id="5" name="Content Placeholder 4" descr="Text, letter&#10;&#10;Description automatically generated">
+          <p:cNvPr id="9" name="Content Placeholder 8" descr="Graphical user interface, table&#10;&#10;Description automatically generated">
             <a:extLst>
               <a:ext uri="{FF2B5EF4-FFF2-40B4-BE49-F238E27FC236}">
-                <a16:creationId xmlns:a16="http://schemas.microsoft.com/office/drawing/2014/main" id="{195D0AAE-4AA0-F34D-BD74-77D00CF7D578}"/>
+                <a16:creationId xmlns:a16="http://schemas.microsoft.com/office/drawing/2014/main" id="{07FF4507-BFB0-D34A-8909-B74A281FD8A9}"/>
               </a:ext>
             </a:extLst>
           </p:cNvPr>
           <p:cNvPicPr>
-            <a:picLocks noChangeAspect="1"/>
+            <a:picLocks noGrp="1" noChangeAspect="1"/>
           </p:cNvPicPr>
-          <p:nvPr/>
+          <p:nvPr>
+            <p:ph idx="1"/>
+          </p:nvPr>
         </p:nvPicPr>
-        <p:blipFill rotWithShape="1">
+        <p:blipFill>
           <a:blip r:embed="rId2"/>
-          <a:srcRect r="4038"/>
-          <a:stretch/>
+          <a:stretch>
+            <a:fillRect/>
+          </a:stretch>
         </p:blipFill>
         <p:spPr>
           <a:xfrm>
-            <a:off x="7519416" y="10"/>
-            <a:ext cx="4672584" cy="6857989"/>
+            <a:off x="2145754" y="2193925"/>
+            <a:ext cx="7900491" cy="4024313"/>
           </a:xfrm>
-          <a:prstGeom prst="rect">
-            <a:avLst/>
-          </a:prstGeom>
         </p:spPr>
       </p:pic>
     </p:spTree>
     <p:extLst>
       <p:ext uri="{BB962C8B-B14F-4D97-AF65-F5344CB8AC3E}">
-        <p14:creationId xmlns:p14="http://schemas.microsoft.com/office/powerpoint/2010/main" val="1521828671"/>
+        <p14:creationId xmlns:p14="http://schemas.microsoft.com/office/powerpoint/2010/main" val="1277650499"/>
       </p:ext>
     </p:extLst>
   </p:cSld>
@@ -12977,14 +13217,6 @@
 <file path=ppt/slides/slide8.xml><?xml version="1.0" encoding="utf-8"?>
 <p:sld xmlns:a="http://schemas.openxmlformats.org/drawingml/2006/main" xmlns:r="http://schemas.openxmlformats.org/officeDocument/2006/relationships" xmlns:p="http://schemas.openxmlformats.org/presentationml/2006/main">
   <p:cSld>
-    <p:bg>
-      <p:bgPr>
-        <a:solidFill>
-          <a:schemeClr val="bg1"/>
-        </a:solidFill>
-        <a:effectLst/>
-      </p:bgPr>
-    </p:bg>
     <p:spTree>
       <p:nvGrpSpPr>
         <p:cNvPr id="1" name=""/>
@@ -13004,7 +13236,7 @@
           <p:cNvPr id="2" name="Title 1">
             <a:extLst>
               <a:ext uri="{FF2B5EF4-FFF2-40B4-BE49-F238E27FC236}">
-                <a16:creationId xmlns:a16="http://schemas.microsoft.com/office/drawing/2014/main" id="{1341808A-88E2-914D-9EF9-27C47D35B8F2}"/>
+                <a16:creationId xmlns:a16="http://schemas.microsoft.com/office/drawing/2014/main" id="{AFD80345-6986-4545-A384-B29442422931}"/>
               </a:ext>
             </a:extLst>
           </p:cNvPr>
@@ -13015,150 +13247,51 @@
             <p:ph type="title"/>
           </p:nvPr>
         </p:nvSpPr>
-        <p:spPr>
-          <a:xfrm>
-            <a:off x="619759" y="764373"/>
-            <a:ext cx="6257291" cy="1293028"/>
-          </a:xfrm>
-        </p:spPr>
+        <p:spPr/>
         <p:txBody>
-          <a:bodyPr>
-            <a:normAutofit/>
-          </a:bodyPr>
+          <a:bodyPr/>
           <a:lstStyle/>
           <a:p>
             <a:r>
-              <a:rPr lang="en-US" sz="3700"/>
-              <a:t>form pertanggungjawaban</a:t>
+              <a:rPr lang="en-US"/>
+              <a:t>delete</a:t>
             </a:r>
-          </a:p>
-        </p:txBody>
-      </p:sp>
-      <p:sp>
-        <p:nvSpPr>
-          <p:cNvPr id="9" name="Content Placeholder 8">
-            <a:extLst>
-              <a:ext uri="{FF2B5EF4-FFF2-40B4-BE49-F238E27FC236}">
-                <a16:creationId xmlns:a16="http://schemas.microsoft.com/office/drawing/2014/main" id="{F03BFE80-07F7-4A72-952D-CF74B7593589}"/>
-              </a:ext>
-            </a:extLst>
-          </p:cNvPr>
-          <p:cNvSpPr>
-            <a:spLocks noGrp="1"/>
-          </p:cNvSpPr>
-          <p:nvPr>
-            <p:ph idx="1"/>
-          </p:nvPr>
-        </p:nvSpPr>
-        <p:spPr>
-          <a:xfrm>
-            <a:off x="619760" y="2194560"/>
-            <a:ext cx="6257290" cy="4024125"/>
-          </a:xfrm>
-        </p:spPr>
-        <p:txBody>
-          <a:bodyPr>
-            <a:normAutofit/>
-          </a:bodyPr>
-          <a:lstStyle/>
-          <a:p>
-            <a:endParaRPr lang="en-US"/>
-          </a:p>
-        </p:txBody>
-      </p:sp>
-      <p:sp useBgFill="1">
-        <p:nvSpPr>
-          <p:cNvPr id="12" name="Rectangle 11">
-            <a:extLst>
-              <a:ext uri="{FF2B5EF4-FFF2-40B4-BE49-F238E27FC236}">
-                <a16:creationId xmlns:a16="http://schemas.microsoft.com/office/drawing/2014/main" id="{E2E0C929-96C6-41B1-A001-566036DF047B}"/>
-              </a:ext>
-              <a:ext uri="{C183D7F6-B498-43B3-948B-1728B52AA6E4}">
-                <adec:decorative xmlns:adec="http://schemas.microsoft.com/office/drawing/2017/decorative" val="1"/>
-              </a:ext>
-            </a:extLst>
-          </p:cNvPr>
-          <p:cNvSpPr>
-            <a:spLocks noGrp="1" noRot="1" noChangeAspect="1" noMove="1" noResize="1" noEditPoints="1" noAdjustHandles="1" noChangeArrowheads="1" noChangeShapeType="1" noTextEdit="1"/>
-          </p:cNvSpPr>
-          <p:nvPr>
-            <p:extLst>
-              <p:ext uri="{386F3935-93C4-4BCD-93E2-E3B085C9AB24}">
-                <p16:designElem xmlns:p16="http://schemas.microsoft.com/office/powerpoint/2015/main" val="1"/>
-              </p:ext>
-            </p:extLst>
-          </p:nvPr>
-        </p:nvSpPr>
-        <p:spPr>
-          <a:xfrm>
-            <a:off x="7188740" y="0"/>
-            <a:ext cx="5003254" cy="6858000"/>
-          </a:xfrm>
-          <a:prstGeom prst="rect">
-            <a:avLst/>
-          </a:prstGeom>
-          <a:ln>
-            <a:noFill/>
-          </a:ln>
-        </p:spPr>
-        <p:style>
-          <a:lnRef idx="2">
-            <a:schemeClr val="accent1">
-              <a:shade val="50000"/>
-            </a:schemeClr>
-          </a:lnRef>
-          <a:fillRef idx="1">
-            <a:schemeClr val="accent1"/>
-          </a:fillRef>
-          <a:effectRef idx="0">
-            <a:schemeClr val="accent1"/>
-          </a:effectRef>
-          <a:fontRef idx="minor">
-            <a:schemeClr val="lt1"/>
-          </a:fontRef>
-        </p:style>
-        <p:txBody>
-          <a:bodyPr rtlCol="0" anchor="ctr"/>
-          <a:lstStyle/>
-          <a:p>
-            <a:pPr algn="ctr"/>
-            <a:endParaRPr lang="en-US"/>
           </a:p>
         </p:txBody>
       </p:sp>
       <p:pic>
         <p:nvPicPr>
-          <p:cNvPr id="5" name="Content Placeholder 4" descr="Table&#10;&#10;Description automatically generated">
+          <p:cNvPr id="5" name="Content Placeholder 4" descr="Graphical user interface, application&#10;&#10;Description automatically generated">
             <a:extLst>
               <a:ext uri="{FF2B5EF4-FFF2-40B4-BE49-F238E27FC236}">
-                <a16:creationId xmlns:a16="http://schemas.microsoft.com/office/drawing/2014/main" id="{AEC29793-9663-3A44-A3AE-3D45433814B0}"/>
+                <a16:creationId xmlns:a16="http://schemas.microsoft.com/office/drawing/2014/main" id="{5D021819-7247-6745-8488-97BF48A18F21}"/>
               </a:ext>
             </a:extLst>
           </p:cNvPr>
           <p:cNvPicPr>
-            <a:picLocks noChangeAspect="1"/>
+            <a:picLocks noGrp="1" noChangeAspect="1"/>
           </p:cNvPicPr>
-          <p:nvPr/>
+          <p:nvPr>
+            <p:ph idx="1"/>
+          </p:nvPr>
         </p:nvPicPr>
-        <p:blipFill rotWithShape="1">
+        <p:blipFill>
           <a:blip r:embed="rId2"/>
-          <a:srcRect r="3698"/>
-          <a:stretch/>
+          <a:stretch>
+            <a:fillRect/>
+          </a:stretch>
         </p:blipFill>
         <p:spPr>
           <a:xfrm>
-            <a:off x="7519416" y="10"/>
-            <a:ext cx="4672584" cy="6857989"/>
+            <a:off x="2145754" y="2193925"/>
+            <a:ext cx="7900491" cy="4024313"/>
           </a:xfrm>
-          <a:prstGeom prst="rect">
-            <a:avLst/>
-          </a:prstGeom>
         </p:spPr>
       </p:pic>
     </p:spTree>
     <p:extLst>
       <p:ext uri="{BB962C8B-B14F-4D97-AF65-F5344CB8AC3E}">
-        <p14:creationId xmlns:p14="http://schemas.microsoft.com/office/powerpoint/2010/main" val="3418362195"/>
+        <p14:creationId xmlns:p14="http://schemas.microsoft.com/office/powerpoint/2010/main" val="4014917255"/>
       </p:ext>
     </p:extLst>
   </p:cSld>
@@ -13198,7 +13331,7 @@
           <p:cNvPr id="2" name="Title 1">
             <a:extLst>
               <a:ext uri="{FF2B5EF4-FFF2-40B4-BE49-F238E27FC236}">
-                <a16:creationId xmlns:a16="http://schemas.microsoft.com/office/drawing/2014/main" id="{02A67534-04A4-A049-977B-67CBC075D376}"/>
+                <a16:creationId xmlns:a16="http://schemas.microsoft.com/office/drawing/2014/main" id="{9F25D696-A74A-EF41-B974-09721833B7C1}"/>
               </a:ext>
             </a:extLst>
           </p:cNvPr>
@@ -13211,8 +13344,8 @@
         </p:nvSpPr>
         <p:spPr>
           <a:xfrm>
-            <a:off x="619760" y="764373"/>
-            <a:ext cx="6832600" cy="1293028"/>
+            <a:off x="619759" y="764373"/>
+            <a:ext cx="6257291" cy="1293028"/>
           </a:xfrm>
         </p:spPr>
         <p:txBody>
@@ -13223,17 +13356,17 @@
           <a:p>
             <a:r>
               <a:rPr lang="en-US"/>
-              <a:t>thank you</a:t>
+              <a:t>form komitmen</a:t>
             </a:r>
           </a:p>
         </p:txBody>
       </p:sp>
       <p:sp>
         <p:nvSpPr>
-          <p:cNvPr id="7" name="Content Placeholder 2">
+          <p:cNvPr id="9" name="Content Placeholder 8">
             <a:extLst>
               <a:ext uri="{FF2B5EF4-FFF2-40B4-BE49-F238E27FC236}">
-                <a16:creationId xmlns:a16="http://schemas.microsoft.com/office/drawing/2014/main" id="{059804AC-0040-4248-B541-33CAB104A6DE}"/>
+                <a16:creationId xmlns:a16="http://schemas.microsoft.com/office/drawing/2014/main" id="{2A2C78A7-6E88-4A9B-B92E-163D7803EBED}"/>
               </a:ext>
             </a:extLst>
           </p:cNvPr>
@@ -13247,7 +13380,7 @@
         <p:spPr>
           <a:xfrm>
             <a:off x="619760" y="2194560"/>
-            <a:ext cx="6832600" cy="4024125"/>
+            <a:ext cx="6257290" cy="4024125"/>
           </a:xfrm>
         </p:spPr>
         <p:txBody>
@@ -13256,28 +13389,76 @@
           </a:bodyPr>
           <a:lstStyle/>
           <a:p>
-            <a:pPr marL="0" indent="0">
-              <a:buNone/>
-            </a:pPr>
-            <a:r>
-              <a:rPr lang="en-US"/>
-              <a:t>https://github.com/sindweller2/FormAutomation</a:t>
-            </a:r>
-          </a:p>
-          <a:p>
-            <a:pPr marL="0" indent="0">
-              <a:buNone/>
-            </a:pPr>
+            <a:endParaRPr lang="en-US"/>
+          </a:p>
+        </p:txBody>
+      </p:sp>
+      <p:sp useBgFill="1">
+        <p:nvSpPr>
+          <p:cNvPr id="12" name="Rectangle 11">
+            <a:extLst>
+              <a:ext uri="{FF2B5EF4-FFF2-40B4-BE49-F238E27FC236}">
+                <a16:creationId xmlns:a16="http://schemas.microsoft.com/office/drawing/2014/main" id="{E2E0C929-96C6-41B1-A001-566036DF047B}"/>
+              </a:ext>
+              <a:ext uri="{C183D7F6-B498-43B3-948B-1728B52AA6E4}">
+                <adec:decorative xmlns:adec="http://schemas.microsoft.com/office/drawing/2017/decorative" val="1"/>
+              </a:ext>
+            </a:extLst>
+          </p:cNvPr>
+          <p:cNvSpPr>
+            <a:spLocks noGrp="1" noRot="1" noChangeAspect="1" noMove="1" noResize="1" noEditPoints="1" noAdjustHandles="1" noChangeArrowheads="1" noChangeShapeType="1" noTextEdit="1"/>
+          </p:cNvSpPr>
+          <p:nvPr>
+            <p:extLst>
+              <p:ext uri="{386F3935-93C4-4BCD-93E2-E3B085C9AB24}">
+                <p16:designElem xmlns:p16="http://schemas.microsoft.com/office/powerpoint/2015/main" val="1"/>
+              </p:ext>
+            </p:extLst>
+          </p:nvPr>
+        </p:nvSpPr>
+        <p:spPr>
+          <a:xfrm>
+            <a:off x="7188740" y="0"/>
+            <a:ext cx="5003254" cy="6858000"/>
+          </a:xfrm>
+          <a:prstGeom prst="rect">
+            <a:avLst/>
+          </a:prstGeom>
+          <a:ln>
+            <a:noFill/>
+          </a:ln>
+        </p:spPr>
+        <p:style>
+          <a:lnRef idx="2">
+            <a:schemeClr val="accent1">
+              <a:shade val="50000"/>
+            </a:schemeClr>
+          </a:lnRef>
+          <a:fillRef idx="1">
+            <a:schemeClr val="accent1"/>
+          </a:fillRef>
+          <a:effectRef idx="0">
+            <a:schemeClr val="accent1"/>
+          </a:effectRef>
+          <a:fontRef idx="minor">
+            <a:schemeClr val="lt1"/>
+          </a:fontRef>
+        </p:style>
+        <p:txBody>
+          <a:bodyPr rtlCol="0" anchor="ctr"/>
+          <a:lstStyle/>
+          <a:p>
+            <a:pPr algn="ctr"/>
             <a:endParaRPr lang="en-US"/>
           </a:p>
         </p:txBody>
       </p:sp>
       <p:pic>
         <p:nvPicPr>
-          <p:cNvPr id="8" name="Picture 4" descr="Data concept">
+          <p:cNvPr id="5" name="Content Placeholder 4" descr="Text, letter&#10;&#10;Description automatically generated">
             <a:extLst>
               <a:ext uri="{FF2B5EF4-FFF2-40B4-BE49-F238E27FC236}">
-                <a16:creationId xmlns:a16="http://schemas.microsoft.com/office/drawing/2014/main" id="{394FF601-0705-4513-A2A1-5F9A6C7E2CB3}"/>
+                <a16:creationId xmlns:a16="http://schemas.microsoft.com/office/drawing/2014/main" id="{195D0AAE-4AA0-F34D-BD74-77D00CF7D578}"/>
               </a:ext>
             </a:extLst>
           </p:cNvPr>
@@ -13288,13 +13469,13 @@
         </p:nvPicPr>
         <p:blipFill rotWithShape="1">
           <a:blip r:embed="rId2"/>
-          <a:srcRect l="4043" r="46004" b="1"/>
+          <a:srcRect r="4038"/>
           <a:stretch/>
         </p:blipFill>
         <p:spPr>
           <a:xfrm>
-            <a:off x="7861238" y="746125"/>
-            <a:ext cx="3644962" cy="5472559"/>
+            <a:off x="7519416" y="10"/>
+            <a:ext cx="4672584" cy="6857989"/>
           </a:xfrm>
           <a:prstGeom prst="rect">
             <a:avLst/>
@@ -13304,7 +13485,7 @@
     </p:spTree>
     <p:extLst>
       <p:ext uri="{BB962C8B-B14F-4D97-AF65-F5344CB8AC3E}">
-        <p14:creationId xmlns:p14="http://schemas.microsoft.com/office/powerpoint/2010/main" val="1994441202"/>
+        <p14:creationId xmlns:p14="http://schemas.microsoft.com/office/powerpoint/2010/main" val="1521828671"/>
       </p:ext>
     </p:extLst>
   </p:cSld>

</xml_diff>